<commit_message>
UI update, bug fix
</commit_message>
<xml_diff>
--- a/Docs/Documentation/Presentations/Iteration 2 - Wander.pptx
+++ b/Docs/Documentation/Presentations/Iteration 2 - Wander.pptx
@@ -251,7 +251,7 @@
           <a:p>
             <a:fld id="{4D0CBB7A-33AF-434C-B8C5-B5F21D294CDF}" type="datetimeFigureOut">
               <a:rPr lang="tr-TR" smtClean="0"/>
-              <a:t>14.12.2015</a:t>
+              <a:t>15.12.2015</a:t>
             </a:fld>
             <a:endParaRPr lang="tr-TR"/>
           </a:p>
@@ -416,7 +416,7 @@
           <a:p>
             <a:fld id="{6C6C1039-E6FF-4F78-9751-FFD9A3AC8099}" type="datetimeFigureOut">
               <a:rPr lang="tr-TR" smtClean="0"/>
-              <a:t>14.12.2015</a:t>
+              <a:t>15.12.2015</a:t>
             </a:fld>
             <a:endParaRPr lang="tr-TR"/>
           </a:p>
@@ -3133,7 +3133,7 @@
           <a:p>
             <a:fld id="{DC9C75F7-98FD-4D05-8C3F-C506B544AE03}" type="datetimeFigureOut">
               <a:rPr lang="tr-TR" smtClean="0"/>
-              <a:t>14.12.2015</a:t>
+              <a:t>15.12.2015</a:t>
             </a:fld>
             <a:endParaRPr lang="tr-TR"/>
           </a:p>
@@ -3322,7 +3322,7 @@
           <a:p>
             <a:fld id="{DC9C75F7-98FD-4D05-8C3F-C506B544AE03}" type="datetimeFigureOut">
               <a:rPr lang="tr-TR" smtClean="0"/>
-              <a:t>14.12.2015</a:t>
+              <a:t>15.12.2015</a:t>
             </a:fld>
             <a:endParaRPr lang="tr-TR"/>
           </a:p>
@@ -3514,7 +3514,7 @@
           <a:p>
             <a:fld id="{DC9C75F7-98FD-4D05-8C3F-C506B544AE03}" type="datetimeFigureOut">
               <a:rPr lang="tr-TR" smtClean="0"/>
-              <a:t>14.12.2015</a:t>
+              <a:t>15.12.2015</a:t>
             </a:fld>
             <a:endParaRPr lang="tr-TR"/>
           </a:p>
@@ -3696,7 +3696,7 @@
           <a:p>
             <a:fld id="{DC9C75F7-98FD-4D05-8C3F-C506B544AE03}" type="datetimeFigureOut">
               <a:rPr lang="tr-TR" smtClean="0"/>
-              <a:t>14.12.2015</a:t>
+              <a:t>15.12.2015</a:t>
             </a:fld>
             <a:endParaRPr lang="tr-TR"/>
           </a:p>
@@ -3954,7 +3954,7 @@
           <a:p>
             <a:fld id="{DC9C75F7-98FD-4D05-8C3F-C506B544AE03}" type="datetimeFigureOut">
               <a:rPr lang="tr-TR" smtClean="0"/>
-              <a:t>14.12.2015</a:t>
+              <a:t>15.12.2015</a:t>
             </a:fld>
             <a:endParaRPr lang="tr-TR"/>
           </a:p>
@@ -4254,7 +4254,7 @@
           <a:p>
             <a:fld id="{DC9C75F7-98FD-4D05-8C3F-C506B544AE03}" type="datetimeFigureOut">
               <a:rPr lang="tr-TR" smtClean="0"/>
-              <a:t>14.12.2015</a:t>
+              <a:t>15.12.2015</a:t>
             </a:fld>
             <a:endParaRPr lang="tr-TR"/>
           </a:p>
@@ -4688,7 +4688,7 @@
           <a:p>
             <a:fld id="{DC9C75F7-98FD-4D05-8C3F-C506B544AE03}" type="datetimeFigureOut">
               <a:rPr lang="tr-TR" smtClean="0"/>
-              <a:t>14.12.2015</a:t>
+              <a:t>15.12.2015</a:t>
             </a:fld>
             <a:endParaRPr lang="tr-TR"/>
           </a:p>
@@ -4818,7 +4818,7 @@
           <a:p>
             <a:fld id="{DC9C75F7-98FD-4D05-8C3F-C506B544AE03}" type="datetimeFigureOut">
               <a:rPr lang="tr-TR" smtClean="0"/>
-              <a:t>14.12.2015</a:t>
+              <a:t>15.12.2015</a:t>
             </a:fld>
             <a:endParaRPr lang="tr-TR"/>
           </a:p>
@@ -4925,7 +4925,7 @@
           <a:p>
             <a:fld id="{DC9C75F7-98FD-4D05-8C3F-C506B544AE03}" type="datetimeFigureOut">
               <a:rPr lang="tr-TR" smtClean="0"/>
-              <a:t>14.12.2015</a:t>
+              <a:t>15.12.2015</a:t>
             </a:fld>
             <a:endParaRPr lang="tr-TR"/>
           </a:p>
@@ -5214,7 +5214,7 @@
           <a:p>
             <a:fld id="{DC9C75F7-98FD-4D05-8C3F-C506B544AE03}" type="datetimeFigureOut">
               <a:rPr lang="tr-TR" smtClean="0"/>
-              <a:t>14.12.2015</a:t>
+              <a:t>15.12.2015</a:t>
             </a:fld>
             <a:endParaRPr lang="tr-TR"/>
           </a:p>
@@ -5479,7 +5479,7 @@
           <a:p>
             <a:fld id="{DC9C75F7-98FD-4D05-8C3F-C506B544AE03}" type="datetimeFigureOut">
               <a:rPr lang="tr-TR" smtClean="0"/>
-              <a:t>14.12.2015</a:t>
+              <a:t>15.12.2015</a:t>
             </a:fld>
             <a:endParaRPr lang="tr-TR"/>
           </a:p>
@@ -5713,7 +5713,7 @@
           <a:p>
             <a:fld id="{DC9C75F7-98FD-4D05-8C3F-C506B544AE03}" type="datetimeFigureOut">
               <a:rPr lang="tr-TR" smtClean="0"/>
-              <a:t>14.12.2015</a:t>
+              <a:t>15.12.2015</a:t>
             </a:fld>
             <a:endParaRPr lang="tr-TR"/>
           </a:p>
@@ -6219,20 +6219,7 @@
                 <a:latin typeface="Segoe UI Light" panose="020B0502040204020203" pitchFamily="34" charset="0"/>
                 <a:cs typeface="Segoe UI Light" panose="020B0502040204020203" pitchFamily="34" charset="0"/>
               </a:rPr>
-              <a:t>Itération </a:t>
-            </a:r>
-            <a:r>
-              <a:rPr lang="fr-FR" sz="3700" dirty="0" smtClean="0">
-                <a:solidFill>
-                  <a:schemeClr val="tx1">
-                    <a:lumMod val="65000"/>
-                    <a:lumOff val="35000"/>
-                  </a:schemeClr>
-                </a:solidFill>
-                <a:latin typeface="Segoe UI Light" panose="020B0502040204020203" pitchFamily="34" charset="0"/>
-                <a:cs typeface="Segoe UI Light" panose="020B0502040204020203" pitchFamily="34" charset="0"/>
-              </a:rPr>
-              <a:t>2</a:t>
+              <a:t>Itération 2</a:t>
             </a:r>
             <a:endParaRPr lang="tr-TR" sz="3700" dirty="0">
               <a:solidFill>
@@ -10771,10 +10758,6 @@
               </a:rPr>
               <a:t>CI mise en place</a:t>
             </a:r>
-            <a:endParaRPr lang="fr-FR" sz="4400" dirty="0" smtClean="0">
-              <a:latin typeface="Segoe UI Light" panose="020B0502040204020203" pitchFamily="34" charset="0"/>
-              <a:cs typeface="Segoe UI Light" panose="020B0502040204020203" pitchFamily="34" charset="0"/>
-            </a:endParaRPr>
           </a:p>
         </p:txBody>
       </p:sp>
@@ -10967,10 +10950,6 @@
               </a:rPr>
               <a:t>Mettre en place la possibilité de rentrer dans une propriété</a:t>
             </a:r>
-            <a:endParaRPr lang="fr-FR" sz="4400" dirty="0" smtClean="0">
-              <a:latin typeface="Segoe UI Light" panose="020B0502040204020203" pitchFamily="34" charset="0"/>
-              <a:cs typeface="Segoe UI Light" panose="020B0502040204020203" pitchFamily="34" charset="0"/>
-            </a:endParaRPr>
           </a:p>
           <a:p>
             <a:pPr marL="342900" indent="-342900" algn="ctr">
@@ -10984,10 +10963,6 @@
               </a:rPr>
               <a:t>Finaliser la version Android/Java</a:t>
             </a:r>
-            <a:endParaRPr lang="fr-FR" sz="4400" dirty="0" smtClean="0">
-              <a:latin typeface="Segoe UI Light" panose="020B0502040204020203" pitchFamily="34" charset="0"/>
-              <a:cs typeface="Segoe UI Light" panose="020B0502040204020203" pitchFamily="34" charset="0"/>
-            </a:endParaRPr>
           </a:p>
           <a:p>
             <a:pPr marL="1159505" lvl="1" indent="-342900" algn="ctr">
@@ -11001,10 +10976,6 @@
               </a:rPr>
               <a:t>Finalisation de la version Web</a:t>
             </a:r>
-            <a:endParaRPr lang="fr-FR" sz="4400" dirty="0" smtClean="0">
-              <a:latin typeface="Segoe UI Light" panose="020B0502040204020203" pitchFamily="34" charset="0"/>
-              <a:cs typeface="Segoe UI Light" panose="020B0502040204020203" pitchFamily="34" charset="0"/>
-            </a:endParaRPr>
           </a:p>
           <a:p>
             <a:endParaRPr lang="tr-TR" sz="4400" dirty="0">

</xml_diff>